<commit_message>
feature figure-lightbox, image cleanup, content updates to use new figure-lightbox shortcode
</commit_message>
<xml_diff>
--- a/post/interview-fundies-longest-prefix-match/Images.pptx
+++ b/post/interview-fundies-longest-prefix-match/Images.pptx
@@ -125,18 +125,18 @@
   <pc:docChgLst>
     <pc:chgData name="John Urbanek" userId="8f9b3a72876d9b56" providerId="LiveId" clId="{D3E25388-BF14-4EB3-86D9-CCD8E22CCD22}"/>
     <pc:docChg chg="modSld">
-      <pc:chgData name="John Urbanek" userId="8f9b3a72876d9b56" providerId="LiveId" clId="{D3E25388-BF14-4EB3-86D9-CCD8E22CCD22}" dt="2020-04-18T04:43:30.855" v="1"/>
+      <pc:chgData name="John Urbanek" userId="8f9b3a72876d9b56" providerId="LiveId" clId="{D3E25388-BF14-4EB3-86D9-CCD8E22CCD22}" dt="2020-04-30T04:43:21.639" v="3" actId="1362"/>
       <pc:docMkLst>
         <pc:docMk/>
       </pc:docMkLst>
-      <pc:sldChg chg="modSp">
-        <pc:chgData name="John Urbanek" userId="8f9b3a72876d9b56" providerId="LiveId" clId="{D3E25388-BF14-4EB3-86D9-CCD8E22CCD22}" dt="2020-04-18T04:43:30.855" v="1"/>
+      <pc:sldChg chg="modSp mod">
+        <pc:chgData name="John Urbanek" userId="8f9b3a72876d9b56" providerId="LiveId" clId="{D3E25388-BF14-4EB3-86D9-CCD8E22CCD22}" dt="2020-04-30T04:43:21.639" v="3" actId="1362"/>
         <pc:sldMkLst>
           <pc:docMk/>
           <pc:sldMk cId="4229374446" sldId="256"/>
         </pc:sldMkLst>
         <pc:picChg chg="mod">
-          <ac:chgData name="John Urbanek" userId="8f9b3a72876d9b56" providerId="LiveId" clId="{D3E25388-BF14-4EB3-86D9-CCD8E22CCD22}" dt="2020-04-18T04:43:30.855" v="1"/>
+          <ac:chgData name="John Urbanek" userId="8f9b3a72876d9b56" providerId="LiveId" clId="{D3E25388-BF14-4EB3-86D9-CCD8E22CCD22}" dt="2020-04-30T04:43:21.639" v="3" actId="1362"/>
           <ac:picMkLst>
             <pc:docMk/>
             <pc:sldMk cId="4229374446" sldId="256"/>
@@ -296,7 +296,7 @@
           <a:p>
             <a:fld id="{D8BDDF2C-4167-4792-AA62-61A32BC192A4}" type="datetimeFigureOut">
               <a:rPr lang="en-US" smtClean="0"/>
-              <a:t>4/17/2020</a:t>
+              <a:t>4/29/2020</a:t>
             </a:fld>
             <a:endParaRPr lang="en-US"/>
           </a:p>
@@ -494,7 +494,7 @@
           <a:p>
             <a:fld id="{D8BDDF2C-4167-4792-AA62-61A32BC192A4}" type="datetimeFigureOut">
               <a:rPr lang="en-US" smtClean="0"/>
-              <a:t>4/17/2020</a:t>
+              <a:t>4/29/2020</a:t>
             </a:fld>
             <a:endParaRPr lang="en-US"/>
           </a:p>
@@ -702,7 +702,7 @@
           <a:p>
             <a:fld id="{D8BDDF2C-4167-4792-AA62-61A32BC192A4}" type="datetimeFigureOut">
               <a:rPr lang="en-US" smtClean="0"/>
-              <a:t>4/17/2020</a:t>
+              <a:t>4/29/2020</a:t>
             </a:fld>
             <a:endParaRPr lang="en-US"/>
           </a:p>
@@ -900,7 +900,7 @@
           <a:p>
             <a:fld id="{D8BDDF2C-4167-4792-AA62-61A32BC192A4}" type="datetimeFigureOut">
               <a:rPr lang="en-US" smtClean="0"/>
-              <a:t>4/17/2020</a:t>
+              <a:t>4/29/2020</a:t>
             </a:fld>
             <a:endParaRPr lang="en-US"/>
           </a:p>
@@ -1175,7 +1175,7 @@
           <a:p>
             <a:fld id="{D8BDDF2C-4167-4792-AA62-61A32BC192A4}" type="datetimeFigureOut">
               <a:rPr lang="en-US" smtClean="0"/>
-              <a:t>4/17/2020</a:t>
+              <a:t>4/29/2020</a:t>
             </a:fld>
             <a:endParaRPr lang="en-US"/>
           </a:p>
@@ -1440,7 +1440,7 @@
           <a:p>
             <a:fld id="{D8BDDF2C-4167-4792-AA62-61A32BC192A4}" type="datetimeFigureOut">
               <a:rPr lang="en-US" smtClean="0"/>
-              <a:t>4/17/2020</a:t>
+              <a:t>4/29/2020</a:t>
             </a:fld>
             <a:endParaRPr lang="en-US"/>
           </a:p>
@@ -1852,7 +1852,7 @@
           <a:p>
             <a:fld id="{D8BDDF2C-4167-4792-AA62-61A32BC192A4}" type="datetimeFigureOut">
               <a:rPr lang="en-US" smtClean="0"/>
-              <a:t>4/17/2020</a:t>
+              <a:t>4/29/2020</a:t>
             </a:fld>
             <a:endParaRPr lang="en-US"/>
           </a:p>
@@ -1993,7 +1993,7 @@
           <a:p>
             <a:fld id="{D8BDDF2C-4167-4792-AA62-61A32BC192A4}" type="datetimeFigureOut">
               <a:rPr lang="en-US" smtClean="0"/>
-              <a:t>4/17/2020</a:t>
+              <a:t>4/29/2020</a:t>
             </a:fld>
             <a:endParaRPr lang="en-US"/>
           </a:p>
@@ -2106,7 +2106,7 @@
           <a:p>
             <a:fld id="{D8BDDF2C-4167-4792-AA62-61A32BC192A4}" type="datetimeFigureOut">
               <a:rPr lang="en-US" smtClean="0"/>
-              <a:t>4/17/2020</a:t>
+              <a:t>4/29/2020</a:t>
             </a:fld>
             <a:endParaRPr lang="en-US"/>
           </a:p>
@@ -2417,7 +2417,7 @@
           <a:p>
             <a:fld id="{D8BDDF2C-4167-4792-AA62-61A32BC192A4}" type="datetimeFigureOut">
               <a:rPr lang="en-US" smtClean="0"/>
-              <a:t>4/17/2020</a:t>
+              <a:t>4/29/2020</a:t>
             </a:fld>
             <a:endParaRPr lang="en-US"/>
           </a:p>
@@ -2705,7 +2705,7 @@
           <a:p>
             <a:fld id="{D8BDDF2C-4167-4792-AA62-61A32BC192A4}" type="datetimeFigureOut">
               <a:rPr lang="en-US" smtClean="0"/>
-              <a:t>4/17/2020</a:t>
+              <a:t>4/29/2020</a:t>
             </a:fld>
             <a:endParaRPr lang="en-US"/>
           </a:p>
@@ -2946,7 +2946,7 @@
           <a:p>
             <a:fld id="{D8BDDF2C-4167-4792-AA62-61A32BC192A4}" type="datetimeFigureOut">
               <a:rPr lang="en-US" smtClean="0"/>
-              <a:t>4/17/2020</a:t>
+              <a:t>4/29/2020</a:t>
             </a:fld>
             <a:endParaRPr lang="en-US"/>
           </a:p>
@@ -3380,15 +3380,6 @@
         <p:blipFill>
           <a:blip r:embed="rId2">
             <a:extLst>
-              <a:ext uri="{BEBA8EAE-BF5A-486C-A8C5-ECC9F3942E4B}">
-                <a14:imgProps xmlns:a14="http://schemas.microsoft.com/office/drawing/2010/main">
-                  <a14:imgLayer r:embed="rId3">
-                    <a14:imgEffect>
-                      <a14:artisticTexturizer/>
-                    </a14:imgEffect>
-                  </a14:imgLayer>
-                </a14:imgProps>
-              </a:ext>
               <a:ext uri="{28A0092B-C50C-407E-A947-70E740481C1C}">
                 <a14:useLocalDpi xmlns:a14="http://schemas.microsoft.com/office/drawing/2010/main" val="0"/>
               </a:ext>
@@ -3406,13 +3397,6 @@
           <a:prstGeom prst="rect">
             <a:avLst/>
           </a:prstGeom>
-          <a:effectLst>
-            <a:outerShdw blurRad="190500" dist="127000" dir="2700000" algn="tl" rotWithShape="0">
-              <a:prstClr val="black">
-                <a:alpha val="40000"/>
-              </a:prstClr>
-            </a:outerShdw>
-          </a:effectLst>
         </p:spPr>
       </p:pic>
     </p:spTree>

</xml_diff>